<commit_message>
improve parallel workshop class
</commit_message>
<xml_diff>
--- a/parallel vs sequential/presentation/Concurrency and parallelism.pptx
+++ b/parallel vs sequential/presentation/Concurrency and parallelism.pptx
@@ -21,23 +21,24 @@
     <p:sldId id="266" r:id="rId16"/>
     <p:sldId id="267" r:id="rId17"/>
     <p:sldId id="268" r:id="rId18"/>
+    <p:sldId id="269" r:id="rId19"/>
   </p:sldIdLst>
   <p:sldSz cy="5143500" cx="9144000"/>
   <p:notesSz cx="6858000" cy="9144000"/>
   <p:embeddedFontLst>
     <p:embeddedFont>
       <p:font typeface="Economica"/>
-      <p:regular r:id="rId19"/>
-      <p:bold r:id="rId20"/>
-      <p:italic r:id="rId21"/>
-      <p:boldItalic r:id="rId22"/>
+      <p:regular r:id="rId20"/>
+      <p:bold r:id="rId21"/>
+      <p:italic r:id="rId22"/>
+      <p:boldItalic r:id="rId23"/>
     </p:embeddedFont>
     <p:embeddedFont>
       <p:font typeface="Open Sans"/>
-      <p:regular r:id="rId23"/>
-      <p:bold r:id="rId24"/>
-      <p:italic r:id="rId25"/>
-      <p:boldItalic r:id="rId26"/>
+      <p:regular r:id="rId24"/>
+      <p:bold r:id="rId25"/>
+      <p:italic r:id="rId26"/>
+      <p:boldItalic r:id="rId27"/>
     </p:embeddedFont>
   </p:embeddedFontLst>
   <p:defaultTextStyle>
@@ -818,7 +819,7 @@
   <p:cSld>
     <p:spTree>
       <p:nvGrpSpPr>
-        <p:cNvPr id="150" name="Shape 150"/>
+        <p:cNvPr id="144" name="Shape 144"/>
         <p:cNvGrpSpPr/>
         <p:nvPr/>
       </p:nvGrpSpPr>
@@ -832,7 +833,7 @@
       </p:grpSpPr>
       <p:sp>
         <p:nvSpPr>
-          <p:cNvPr id="151" name="Google Shape;151;g39bca7c0282_0_8:notes"/>
+          <p:cNvPr id="145" name="Google Shape;145;g39bca7c0282_0_16:notes"/>
           <p:cNvSpPr/>
           <p:nvPr>
             <p:ph idx="2" type="sldImg"/>
@@ -867,7 +868,7 @@
       </p:sp>
       <p:sp>
         <p:nvSpPr>
-          <p:cNvPr id="152" name="Google Shape;152;g39bca7c0282_0_8:notes"/>
+          <p:cNvPr id="146" name="Google Shape;146;g39bca7c0282_0_16:notes"/>
           <p:cNvSpPr txBox="1"/>
           <p:nvPr>
             <p:ph idx="1" type="body"/>
@@ -917,7 +918,7 @@
   <p:cSld>
     <p:spTree>
       <p:nvGrpSpPr>
-        <p:cNvPr id="158" name="Shape 158"/>
+        <p:cNvPr id="160" name="Shape 160"/>
         <p:cNvGrpSpPr/>
         <p:nvPr/>
       </p:nvGrpSpPr>
@@ -931,7 +932,7 @@
       </p:grpSpPr>
       <p:sp>
         <p:nvSpPr>
-          <p:cNvPr id="159" name="Google Shape;159;g39bca7c0282_0_44:notes"/>
+          <p:cNvPr id="161" name="Google Shape;161;g39bca7c0282_0_8:notes"/>
           <p:cNvSpPr/>
           <p:nvPr>
             <p:ph idx="2" type="sldImg"/>
@@ -966,7 +967,7 @@
       </p:sp>
       <p:sp>
         <p:nvSpPr>
-          <p:cNvPr id="160" name="Google Shape;160;g39bca7c0282_0_44:notes"/>
+          <p:cNvPr id="162" name="Google Shape;162;g39bca7c0282_0_8:notes"/>
           <p:cNvSpPr txBox="1"/>
           <p:nvPr>
             <p:ph idx="1" type="body"/>
@@ -1016,7 +1017,7 @@
   <p:cSld>
     <p:spTree>
       <p:nvGrpSpPr>
-        <p:cNvPr id="164" name="Shape 164"/>
+        <p:cNvPr id="168" name="Shape 168"/>
         <p:cNvGrpSpPr/>
         <p:nvPr/>
       </p:nvGrpSpPr>
@@ -1030,7 +1031,7 @@
       </p:grpSpPr>
       <p:sp>
         <p:nvSpPr>
-          <p:cNvPr id="165" name="Google Shape;165;g39bca7c0282_0_49:notes"/>
+          <p:cNvPr id="169" name="Google Shape;169;g39bca7c0282_0_44:notes"/>
           <p:cNvSpPr/>
           <p:nvPr>
             <p:ph idx="2" type="sldImg"/>
@@ -1065,7 +1066,7 @@
       </p:sp>
       <p:sp>
         <p:nvSpPr>
-          <p:cNvPr id="166" name="Google Shape;166;g39bca7c0282_0_49:notes"/>
+          <p:cNvPr id="170" name="Google Shape;170;g39bca7c0282_0_44:notes"/>
           <p:cNvSpPr txBox="1"/>
           <p:nvPr>
             <p:ph idx="1" type="body"/>
@@ -1115,7 +1116,7 @@
   <p:cSld>
     <p:spTree>
       <p:nvGrpSpPr>
-        <p:cNvPr id="171" name="Shape 171"/>
+        <p:cNvPr id="174" name="Shape 174"/>
         <p:cNvGrpSpPr/>
         <p:nvPr/>
       </p:nvGrpSpPr>
@@ -1129,7 +1130,7 @@
       </p:grpSpPr>
       <p:sp>
         <p:nvSpPr>
-          <p:cNvPr id="172" name="Google Shape;172;g39bca7c0282_0_57:notes"/>
+          <p:cNvPr id="175" name="Google Shape;175;g39bca7c0282_0_49:notes"/>
           <p:cNvSpPr/>
           <p:nvPr>
             <p:ph idx="2" type="sldImg"/>
@@ -1164,7 +1165,106 @@
       </p:sp>
       <p:sp>
         <p:nvSpPr>
-          <p:cNvPr id="173" name="Google Shape;173;g39bca7c0282_0_57:notes"/>
+          <p:cNvPr id="176" name="Google Shape;176;g39bca7c0282_0_49:notes"/>
+          <p:cNvSpPr txBox="1"/>
+          <p:nvPr>
+            <p:ph idx="1" type="body"/>
+          </p:nvPr>
+        </p:nvSpPr>
+        <p:spPr>
+          <a:xfrm>
+            <a:off x="685800" y="4343400"/>
+            <a:ext cx="5486400" cy="4114800"/>
+          </a:xfrm>
+          <a:prstGeom prst="rect">
+            <a:avLst/>
+          </a:prstGeom>
+        </p:spPr>
+        <p:txBody>
+          <a:bodyPr anchorCtr="0" anchor="t" bIns="91425" lIns="91425" spcFirstLastPara="1" rIns="91425" wrap="square" tIns="91425">
+            <a:noAutofit/>
+          </a:bodyPr>
+          <a:lstStyle/>
+          <a:p>
+            <a:pPr indent="0" lvl="0" marL="0" rtl="0" algn="l">
+              <a:spcBef>
+                <a:spcPts val="0"/>
+              </a:spcBef>
+              <a:spcAft>
+                <a:spcPts val="0"/>
+              </a:spcAft>
+              <a:buNone/>
+            </a:pPr>
+            <a:r>
+              <a:t/>
+            </a:r>
+            <a:endParaRPr/>
+          </a:p>
+        </p:txBody>
+      </p:sp>
+    </p:spTree>
+  </p:cSld>
+  <p:clrMapOvr>
+    <a:masterClrMapping/>
+  </p:clrMapOvr>
+</p:notes>
+</file>
+
+<file path=ppt/notesSlides/notesSlide14.xml><?xml version="1.0" encoding="utf-8"?>
+<p:notes xmlns:a="http://schemas.openxmlformats.org/drawingml/2006/main" xmlns:r="http://schemas.openxmlformats.org/officeDocument/2006/relationships" xmlns:mc="http://schemas.openxmlformats.org/markup-compatibility/2006" xmlns:mv="urn:schemas-microsoft-com:mac:vml" xmlns:p="http://schemas.openxmlformats.org/presentationml/2006/main" xmlns:c="http://schemas.openxmlformats.org/drawingml/2006/chart" xmlns:dgm="http://schemas.openxmlformats.org/drawingml/2006/diagram" xmlns:o="urn:schemas-microsoft-com:office:office" xmlns:v="urn:schemas-microsoft-com:vml" xmlns:pvml="urn:schemas-microsoft-com:office:powerpoint" xmlns:com="http://schemas.openxmlformats.org/drawingml/2006/compatibility" xmlns:p14="http://schemas.microsoft.com/office/powerpoint/2010/main" xmlns:p15="http://schemas.microsoft.com/office/powerpoint/2012/main" xmlns:ahyp="http://schemas.microsoft.com/office/drawing/2018/hyperlinkcolor" showMasterPhAnim="0" showMasterSp="0">
+  <p:cSld>
+    <p:spTree>
+      <p:nvGrpSpPr>
+        <p:cNvPr id="181" name="Shape 181"/>
+        <p:cNvGrpSpPr/>
+        <p:nvPr/>
+      </p:nvGrpSpPr>
+      <p:grpSpPr>
+        <a:xfrm>
+          <a:off x="0" y="0"/>
+          <a:ext cx="0" cy="0"/>
+          <a:chOff x="0" y="0"/>
+          <a:chExt cx="0" cy="0"/>
+        </a:xfrm>
+      </p:grpSpPr>
+      <p:sp>
+        <p:nvSpPr>
+          <p:cNvPr id="182" name="Google Shape;182;g39bca7c0282_0_57:notes"/>
+          <p:cNvSpPr/>
+          <p:nvPr>
+            <p:ph idx="2" type="sldImg"/>
+          </p:nvPr>
+        </p:nvSpPr>
+        <p:spPr>
+          <a:xfrm>
+            <a:off x="381300" y="685800"/>
+            <a:ext cx="6096000" cy="3429000"/>
+          </a:xfrm>
+          <a:custGeom>
+            <a:rect b="b" l="l" r="r" t="t"/>
+            <a:pathLst>
+              <a:path extrusionOk="0" h="120000" w="120000">
+                <a:moveTo>
+                  <a:pt x="0" y="0"/>
+                </a:moveTo>
+                <a:lnTo>
+                  <a:pt x="120000" y="0"/>
+                </a:lnTo>
+                <a:lnTo>
+                  <a:pt x="120000" y="120000"/>
+                </a:lnTo>
+                <a:lnTo>
+                  <a:pt x="0" y="120000"/>
+                </a:lnTo>
+                <a:close/>
+              </a:path>
+            </a:pathLst>
+          </a:custGeom>
+        </p:spPr>
+      </p:sp>
+      <p:sp>
+        <p:nvSpPr>
+          <p:cNvPr id="183" name="Google Shape;183;g39bca7c0282_0_57:notes"/>
           <p:cNvSpPr txBox="1"/>
           <p:nvPr>
             <p:ph idx="1" type="body"/>
@@ -1610,7 +1710,7 @@
   <p:cSld>
     <p:spTree>
       <p:nvGrpSpPr>
-        <p:cNvPr id="113" name="Shape 113"/>
+        <p:cNvPr id="114" name="Shape 114"/>
         <p:cNvGrpSpPr/>
         <p:nvPr/>
       </p:nvGrpSpPr>
@@ -1624,7 +1724,7 @@
       </p:grpSpPr>
       <p:sp>
         <p:nvSpPr>
-          <p:cNvPr id="114" name="Google Shape;114;g39b8c3630d4_0_9:notes"/>
+          <p:cNvPr id="115" name="Google Shape;115;g39bf5509378_0_16:notes"/>
           <p:cNvSpPr/>
           <p:nvPr>
             <p:ph idx="2" type="sldImg"/>
@@ -1659,7 +1759,7 @@
       </p:sp>
       <p:sp>
         <p:nvSpPr>
-          <p:cNvPr id="115" name="Google Shape;115;g39b8c3630d4_0_9:notes"/>
+          <p:cNvPr id="116" name="Google Shape;116;g39bf5509378_0_16:notes"/>
           <p:cNvSpPr txBox="1"/>
           <p:nvPr>
             <p:ph idx="1" type="body"/>
@@ -1709,7 +1809,7 @@
   <p:cSld>
     <p:spTree>
       <p:nvGrpSpPr>
-        <p:cNvPr id="121" name="Shape 121"/>
+        <p:cNvPr id="123" name="Shape 123"/>
         <p:cNvGrpSpPr/>
         <p:nvPr/>
       </p:nvGrpSpPr>
@@ -1723,7 +1823,7 @@
       </p:grpSpPr>
       <p:sp>
         <p:nvSpPr>
-          <p:cNvPr id="122" name="Google Shape;122;g39ae7f54f15_0_105:notes"/>
+          <p:cNvPr id="124" name="Google Shape;124;g39b8c3630d4_0_9:notes"/>
           <p:cNvSpPr/>
           <p:nvPr>
             <p:ph idx="2" type="sldImg"/>
@@ -1758,7 +1858,7 @@
       </p:sp>
       <p:sp>
         <p:nvSpPr>
-          <p:cNvPr id="123" name="Google Shape;123;g39ae7f54f15_0_105:notes"/>
+          <p:cNvPr id="125" name="Google Shape;125;g39b8c3630d4_0_9:notes"/>
           <p:cNvSpPr txBox="1"/>
           <p:nvPr>
             <p:ph idx="1" type="body"/>
@@ -1808,7 +1908,7 @@
   <p:cSld>
     <p:spTree>
       <p:nvGrpSpPr>
-        <p:cNvPr id="127" name="Shape 127"/>
+        <p:cNvPr id="131" name="Shape 131"/>
         <p:cNvGrpSpPr/>
         <p:nvPr/>
       </p:nvGrpSpPr>
@@ -1822,7 +1922,7 @@
       </p:grpSpPr>
       <p:sp>
         <p:nvSpPr>
-          <p:cNvPr id="128" name="Google Shape;128;g39bca7c0282_0_1:notes"/>
+          <p:cNvPr id="132" name="Google Shape;132;g39ae7f54f15_0_105:notes"/>
           <p:cNvSpPr/>
           <p:nvPr>
             <p:ph idx="2" type="sldImg"/>
@@ -1857,7 +1957,7 @@
       </p:sp>
       <p:sp>
         <p:nvSpPr>
-          <p:cNvPr id="129" name="Google Shape;129;g39bca7c0282_0_1:notes"/>
+          <p:cNvPr id="133" name="Google Shape;133;g39ae7f54f15_0_105:notes"/>
           <p:cNvSpPr txBox="1"/>
           <p:nvPr>
             <p:ph idx="1" type="body"/>
@@ -1907,7 +2007,7 @@
   <p:cSld>
     <p:spTree>
       <p:nvGrpSpPr>
-        <p:cNvPr id="134" name="Shape 134"/>
+        <p:cNvPr id="137" name="Shape 137"/>
         <p:cNvGrpSpPr/>
         <p:nvPr/>
       </p:nvGrpSpPr>
@@ -1921,7 +2021,7 @@
       </p:grpSpPr>
       <p:sp>
         <p:nvSpPr>
-          <p:cNvPr id="135" name="Google Shape;135;g39bca7c0282_0_16:notes"/>
+          <p:cNvPr id="138" name="Google Shape;138;g39bca7c0282_0_1:notes"/>
           <p:cNvSpPr/>
           <p:nvPr>
             <p:ph idx="2" type="sldImg"/>
@@ -1956,7 +2056,7 @@
       </p:sp>
       <p:sp>
         <p:nvSpPr>
-          <p:cNvPr id="136" name="Google Shape;136;g39bca7c0282_0_16:notes"/>
+          <p:cNvPr id="139" name="Google Shape;139;g39bca7c0282_0_1:notes"/>
           <p:cNvSpPr txBox="1"/>
           <p:nvPr>
             <p:ph idx="1" type="body"/>
@@ -7576,7 +7676,655 @@
   <p:cSld>
     <p:spTree>
       <p:nvGrpSpPr>
-        <p:cNvPr id="153" name="Shape 153"/>
+        <p:cNvPr id="147" name="Shape 147"/>
+        <p:cNvGrpSpPr/>
+        <p:nvPr/>
+      </p:nvGrpSpPr>
+      <p:grpSpPr>
+        <a:xfrm>
+          <a:off x="0" y="0"/>
+          <a:ext cx="0" cy="0"/>
+          <a:chOff x="0" y="0"/>
+          <a:chExt cx="0" cy="0"/>
+        </a:xfrm>
+      </p:grpSpPr>
+      <p:sp>
+        <p:nvSpPr>
+          <p:cNvPr id="148" name="Google Shape;148;p22"/>
+          <p:cNvSpPr txBox="1"/>
+          <p:nvPr>
+            <p:ph type="title"/>
+          </p:nvPr>
+        </p:nvSpPr>
+        <p:spPr>
+          <a:xfrm>
+            <a:off x="311700" y="-201375"/>
+            <a:ext cx="8520600" cy="2302200"/>
+          </a:xfrm>
+          <a:prstGeom prst="rect">
+            <a:avLst/>
+          </a:prstGeom>
+        </p:spPr>
+        <p:txBody>
+          <a:bodyPr anchorCtr="0" anchor="b" bIns="91425" lIns="91425" spcFirstLastPara="1" rIns="91425" wrap="square" tIns="91425">
+            <a:normAutofit/>
+          </a:bodyPr>
+          <a:lstStyle/>
+          <a:p>
+            <a:pPr indent="0" lvl="0" marL="0" rtl="0" algn="l">
+              <a:spcBef>
+                <a:spcPts val="0"/>
+              </a:spcBef>
+              <a:spcAft>
+                <a:spcPts val="0"/>
+              </a:spcAft>
+              <a:buNone/>
+            </a:pPr>
+            <a:r>
+              <a:rPr lang="es"/>
+              <a:t>Example </a:t>
+            </a:r>
+            <a:endParaRPr/>
+          </a:p>
+          <a:p>
+            <a:pPr indent="0" lvl="0" marL="0" rtl="0" algn="l">
+              <a:spcBef>
+                <a:spcPts val="0"/>
+              </a:spcBef>
+              <a:spcAft>
+                <a:spcPts val="0"/>
+              </a:spcAft>
+              <a:buNone/>
+            </a:pPr>
+            <a:r>
+              <a:rPr lang="es"/>
+              <a:t>multiple</a:t>
+            </a:r>
+            <a:endParaRPr/>
+          </a:p>
+          <a:p>
+            <a:pPr indent="0" lvl="0" marL="0" rtl="0" algn="l">
+              <a:spcBef>
+                <a:spcPts val="0"/>
+              </a:spcBef>
+              <a:spcAft>
+                <a:spcPts val="0"/>
+              </a:spcAft>
+              <a:buNone/>
+            </a:pPr>
+            <a:r>
+              <a:rPr lang="es"/>
+              <a:t>core </a:t>
+            </a:r>
+            <a:endParaRPr/>
+          </a:p>
+        </p:txBody>
+      </p:sp>
+      <p:pic>
+        <p:nvPicPr>
+          <p:cNvPr id="149" name="Google Shape;149;p22" title="Screenshot 2025-10-21 094736.png"/>
+          <p:cNvPicPr preferRelativeResize="0"/>
+          <p:nvPr/>
+        </p:nvPicPr>
+        <p:blipFill rotWithShape="1">
+          <a:blip r:embed="rId3">
+            <a:alphaModFix/>
+          </a:blip>
+          <a:srcRect b="21473" l="0" r="0" t="13515"/>
+          <a:stretch/>
+        </p:blipFill>
+        <p:spPr>
+          <a:xfrm>
+            <a:off x="2471075" y="277574"/>
+            <a:ext cx="5954199" cy="4533899"/>
+          </a:xfrm>
+          <a:prstGeom prst="rect">
+            <a:avLst/>
+          </a:prstGeom>
+          <a:noFill/>
+          <a:ln>
+            <a:noFill/>
+          </a:ln>
+        </p:spPr>
+      </p:pic>
+      <p:sp>
+        <p:nvSpPr>
+          <p:cNvPr id="150" name="Google Shape;150;p22"/>
+          <p:cNvSpPr txBox="1"/>
+          <p:nvPr/>
+        </p:nvSpPr>
+        <p:spPr>
+          <a:xfrm>
+            <a:off x="5818400" y="1148450"/>
+            <a:ext cx="2422200" cy="738900"/>
+          </a:xfrm>
+          <a:prstGeom prst="rect">
+            <a:avLst/>
+          </a:prstGeom>
+          <a:noFill/>
+          <a:ln>
+            <a:noFill/>
+          </a:ln>
+        </p:spPr>
+        <p:txBody>
+          <a:bodyPr anchorCtr="0" anchor="t" bIns="91425" lIns="91425" spcFirstLastPara="1" rIns="91425" wrap="square" tIns="91425">
+            <a:spAutoFit/>
+          </a:bodyPr>
+          <a:lstStyle/>
+          <a:p>
+            <a:pPr indent="0" lvl="0" marL="0" rtl="0" algn="l">
+              <a:spcBef>
+                <a:spcPts val="0"/>
+              </a:spcBef>
+              <a:spcAft>
+                <a:spcPts val="0"/>
+              </a:spcAft>
+              <a:buNone/>
+            </a:pPr>
+            <a:r>
+              <a:rPr lang="es" sz="1800">
+                <a:solidFill>
+                  <a:schemeClr val="dk1"/>
+                </a:solidFill>
+                <a:highlight>
+                  <a:srgbClr val="FFFF00"/>
+                </a:highlight>
+                <a:latin typeface="Open Sans"/>
+                <a:ea typeface="Open Sans"/>
+                <a:cs typeface="Open Sans"/>
+                <a:sym typeface="Open Sans"/>
+              </a:rPr>
+              <a:t>split the image rows in N process parts</a:t>
+            </a:r>
+            <a:endParaRPr sz="1800">
+              <a:solidFill>
+                <a:schemeClr val="dk1"/>
+              </a:solidFill>
+              <a:highlight>
+                <a:srgbClr val="FFFF00"/>
+              </a:highlight>
+              <a:latin typeface="Open Sans"/>
+              <a:ea typeface="Open Sans"/>
+              <a:cs typeface="Open Sans"/>
+              <a:sym typeface="Open Sans"/>
+            </a:endParaRPr>
+          </a:p>
+        </p:txBody>
+      </p:sp>
+      <p:cxnSp>
+        <p:nvCxnSpPr>
+          <p:cNvPr id="151" name="Google Shape;151;p22"/>
+          <p:cNvCxnSpPr>
+            <a:endCxn id="150" idx="1"/>
+          </p:cNvCxnSpPr>
+          <p:nvPr/>
+        </p:nvCxnSpPr>
+        <p:spPr>
+          <a:xfrm flipH="1" rot="10800000">
+            <a:off x="4071200" y="1517900"/>
+            <a:ext cx="1747200" cy="207600"/>
+          </a:xfrm>
+          <a:prstGeom prst="straightConnector1">
+            <a:avLst/>
+          </a:prstGeom>
+          <a:noFill/>
+          <a:ln cap="flat" cmpd="sng" w="9525">
+            <a:solidFill>
+              <a:schemeClr val="dk2"/>
+            </a:solidFill>
+            <a:prstDash val="solid"/>
+            <a:round/>
+            <a:headEnd len="med" w="med" type="none"/>
+            <a:tailEnd len="med" w="med" type="triangle"/>
+          </a:ln>
+        </p:spPr>
+      </p:cxnSp>
+      <p:sp>
+        <p:nvSpPr>
+          <p:cNvPr id="152" name="Google Shape;152;p22"/>
+          <p:cNvSpPr txBox="1"/>
+          <p:nvPr/>
+        </p:nvSpPr>
+        <p:spPr>
+          <a:xfrm>
+            <a:off x="5987125" y="2100825"/>
+            <a:ext cx="2939100" cy="738900"/>
+          </a:xfrm>
+          <a:prstGeom prst="rect">
+            <a:avLst/>
+          </a:prstGeom>
+          <a:noFill/>
+          <a:ln>
+            <a:noFill/>
+          </a:ln>
+        </p:spPr>
+        <p:txBody>
+          <a:bodyPr anchorCtr="0" anchor="t" bIns="91425" lIns="91425" spcFirstLastPara="1" rIns="91425" wrap="square" tIns="91425">
+            <a:spAutoFit/>
+          </a:bodyPr>
+          <a:lstStyle/>
+          <a:p>
+            <a:pPr indent="0" lvl="0" marL="0" rtl="0" algn="l">
+              <a:spcBef>
+                <a:spcPts val="0"/>
+              </a:spcBef>
+              <a:spcAft>
+                <a:spcPts val="0"/>
+              </a:spcAft>
+              <a:buNone/>
+            </a:pPr>
+            <a:r>
+              <a:rPr lang="es" sz="1800">
+                <a:solidFill>
+                  <a:schemeClr val="dk1"/>
+                </a:solidFill>
+                <a:highlight>
+                  <a:srgbClr val="FFFF00"/>
+                </a:highlight>
+                <a:latin typeface="Open Sans"/>
+                <a:ea typeface="Open Sans"/>
+                <a:cs typeface="Open Sans"/>
+                <a:sym typeface="Open Sans"/>
+              </a:rPr>
+              <a:t>shared image memory</a:t>
+            </a:r>
+            <a:endParaRPr sz="1800">
+              <a:solidFill>
+                <a:schemeClr val="dk1"/>
+              </a:solidFill>
+              <a:highlight>
+                <a:srgbClr val="FFFF00"/>
+              </a:highlight>
+              <a:latin typeface="Open Sans"/>
+              <a:ea typeface="Open Sans"/>
+              <a:cs typeface="Open Sans"/>
+              <a:sym typeface="Open Sans"/>
+            </a:endParaRPr>
+          </a:p>
+          <a:p>
+            <a:pPr indent="0" lvl="0" marL="0" rtl="0" algn="l">
+              <a:spcBef>
+                <a:spcPts val="0"/>
+              </a:spcBef>
+              <a:spcAft>
+                <a:spcPts val="0"/>
+              </a:spcAft>
+              <a:buNone/>
+            </a:pPr>
+            <a:r>
+              <a:rPr lang="es" sz="1800">
+                <a:solidFill>
+                  <a:schemeClr val="dk1"/>
+                </a:solidFill>
+                <a:highlight>
+                  <a:srgbClr val="FFFF00"/>
+                </a:highlight>
+                <a:latin typeface="Open Sans"/>
+                <a:ea typeface="Open Sans"/>
+                <a:cs typeface="Open Sans"/>
+                <a:sym typeface="Open Sans"/>
+              </a:rPr>
+              <a:t>for every process</a:t>
+            </a:r>
+            <a:endParaRPr sz="1800">
+              <a:solidFill>
+                <a:schemeClr val="dk1"/>
+              </a:solidFill>
+              <a:highlight>
+                <a:srgbClr val="FFFF00"/>
+              </a:highlight>
+              <a:latin typeface="Open Sans"/>
+              <a:ea typeface="Open Sans"/>
+              <a:cs typeface="Open Sans"/>
+              <a:sym typeface="Open Sans"/>
+            </a:endParaRPr>
+          </a:p>
+        </p:txBody>
+      </p:sp>
+      <p:cxnSp>
+        <p:nvCxnSpPr>
+          <p:cNvPr id="153" name="Google Shape;153;p22"/>
+          <p:cNvCxnSpPr>
+            <a:endCxn id="152" idx="1"/>
+          </p:cNvCxnSpPr>
+          <p:nvPr/>
+        </p:nvCxnSpPr>
+        <p:spPr>
+          <a:xfrm>
+            <a:off x="3924325" y="2242575"/>
+            <a:ext cx="2062800" cy="227700"/>
+          </a:xfrm>
+          <a:prstGeom prst="straightConnector1">
+            <a:avLst/>
+          </a:prstGeom>
+          <a:noFill/>
+          <a:ln cap="flat" cmpd="sng" w="9525">
+            <a:solidFill>
+              <a:schemeClr val="dk2"/>
+            </a:solidFill>
+            <a:prstDash val="solid"/>
+            <a:round/>
+            <a:headEnd len="med" w="med" type="none"/>
+            <a:tailEnd len="med" w="med" type="triangle"/>
+          </a:ln>
+        </p:spPr>
+      </p:cxnSp>
+      <p:sp>
+        <p:nvSpPr>
+          <p:cNvPr id="154" name="Google Shape;154;p22"/>
+          <p:cNvSpPr txBox="1"/>
+          <p:nvPr/>
+        </p:nvSpPr>
+        <p:spPr>
+          <a:xfrm>
+            <a:off x="152375" y="2525350"/>
+            <a:ext cx="2939100" cy="738900"/>
+          </a:xfrm>
+          <a:prstGeom prst="rect">
+            <a:avLst/>
+          </a:prstGeom>
+          <a:noFill/>
+          <a:ln>
+            <a:noFill/>
+          </a:ln>
+        </p:spPr>
+        <p:txBody>
+          <a:bodyPr anchorCtr="0" anchor="t" bIns="91425" lIns="91425" spcFirstLastPara="1" rIns="91425" wrap="square" tIns="91425">
+            <a:spAutoFit/>
+          </a:bodyPr>
+          <a:lstStyle/>
+          <a:p>
+            <a:pPr indent="0" lvl="0" marL="0" rtl="0" algn="l">
+              <a:spcBef>
+                <a:spcPts val="0"/>
+              </a:spcBef>
+              <a:spcAft>
+                <a:spcPts val="0"/>
+              </a:spcAft>
+              <a:buNone/>
+            </a:pPr>
+            <a:r>
+              <a:rPr lang="es" sz="1800">
+                <a:solidFill>
+                  <a:schemeClr val="dk1"/>
+                </a:solidFill>
+                <a:highlight>
+                  <a:srgbClr val="FFFF00"/>
+                </a:highlight>
+                <a:latin typeface="Open Sans"/>
+                <a:ea typeface="Open Sans"/>
+                <a:cs typeface="Open Sans"/>
+                <a:sym typeface="Open Sans"/>
+              </a:rPr>
+              <a:t>create workers and </a:t>
+            </a:r>
+            <a:r>
+              <a:rPr lang="es" sz="1800">
+                <a:solidFill>
+                  <a:schemeClr val="dk1"/>
+                </a:solidFill>
+                <a:highlight>
+                  <a:srgbClr val="FFFF00"/>
+                </a:highlight>
+                <a:latin typeface="Open Sans"/>
+                <a:ea typeface="Open Sans"/>
+                <a:cs typeface="Open Sans"/>
+                <a:sym typeface="Open Sans"/>
+              </a:rPr>
+              <a:t>assign</a:t>
+            </a:r>
+            <a:r>
+              <a:rPr lang="es" sz="1800">
+                <a:solidFill>
+                  <a:schemeClr val="dk1"/>
+                </a:solidFill>
+                <a:highlight>
+                  <a:srgbClr val="FFFF00"/>
+                </a:highlight>
+                <a:latin typeface="Open Sans"/>
+                <a:ea typeface="Open Sans"/>
+                <a:cs typeface="Open Sans"/>
+                <a:sym typeface="Open Sans"/>
+              </a:rPr>
+              <a:t> the row range</a:t>
+            </a:r>
+            <a:endParaRPr sz="1800">
+              <a:solidFill>
+                <a:schemeClr val="dk1"/>
+              </a:solidFill>
+              <a:highlight>
+                <a:srgbClr val="FFFF00"/>
+              </a:highlight>
+              <a:latin typeface="Open Sans"/>
+              <a:ea typeface="Open Sans"/>
+              <a:cs typeface="Open Sans"/>
+              <a:sym typeface="Open Sans"/>
+            </a:endParaRPr>
+          </a:p>
+        </p:txBody>
+      </p:sp>
+      <p:cxnSp>
+        <p:nvCxnSpPr>
+          <p:cNvPr id="155" name="Google Shape;155;p22"/>
+          <p:cNvCxnSpPr/>
+          <p:nvPr/>
+        </p:nvCxnSpPr>
+        <p:spPr>
+          <a:xfrm rot="10800000">
+            <a:off x="2334975" y="2814050"/>
+            <a:ext cx="533400" cy="10800"/>
+          </a:xfrm>
+          <a:prstGeom prst="straightConnector1">
+            <a:avLst/>
+          </a:prstGeom>
+          <a:noFill/>
+          <a:ln cap="flat" cmpd="sng" w="9525">
+            <a:solidFill>
+              <a:schemeClr val="dk2"/>
+            </a:solidFill>
+            <a:prstDash val="solid"/>
+            <a:round/>
+            <a:headEnd len="med" w="med" type="none"/>
+            <a:tailEnd len="med" w="med" type="triangle"/>
+          </a:ln>
+        </p:spPr>
+      </p:cxnSp>
+      <p:sp>
+        <p:nvSpPr>
+          <p:cNvPr id="156" name="Google Shape;156;p22"/>
+          <p:cNvSpPr txBox="1"/>
+          <p:nvPr/>
+        </p:nvSpPr>
+        <p:spPr>
+          <a:xfrm>
+            <a:off x="5214225" y="3499600"/>
+            <a:ext cx="2939100" cy="738900"/>
+          </a:xfrm>
+          <a:prstGeom prst="rect">
+            <a:avLst/>
+          </a:prstGeom>
+          <a:noFill/>
+          <a:ln>
+            <a:noFill/>
+          </a:ln>
+        </p:spPr>
+        <p:txBody>
+          <a:bodyPr anchorCtr="0" anchor="t" bIns="91425" lIns="91425" spcFirstLastPara="1" rIns="91425" wrap="square" tIns="91425">
+            <a:spAutoFit/>
+          </a:bodyPr>
+          <a:lstStyle/>
+          <a:p>
+            <a:pPr indent="0" lvl="0" marL="0" rtl="0" algn="l">
+              <a:spcBef>
+                <a:spcPts val="0"/>
+              </a:spcBef>
+              <a:spcAft>
+                <a:spcPts val="0"/>
+              </a:spcAft>
+              <a:buNone/>
+            </a:pPr>
+            <a:r>
+              <a:rPr lang="es" sz="1800">
+                <a:solidFill>
+                  <a:schemeClr val="dk1"/>
+                </a:solidFill>
+                <a:highlight>
+                  <a:srgbClr val="FFFF00"/>
+                </a:highlight>
+                <a:latin typeface="Open Sans"/>
+                <a:ea typeface="Open Sans"/>
+                <a:cs typeface="Open Sans"/>
+                <a:sym typeface="Open Sans"/>
+              </a:rPr>
+              <a:t>recover the image and close the shared memory</a:t>
+            </a:r>
+            <a:endParaRPr sz="1800">
+              <a:solidFill>
+                <a:schemeClr val="dk1"/>
+              </a:solidFill>
+              <a:highlight>
+                <a:srgbClr val="FFFF00"/>
+              </a:highlight>
+              <a:latin typeface="Open Sans"/>
+              <a:ea typeface="Open Sans"/>
+              <a:cs typeface="Open Sans"/>
+              <a:sym typeface="Open Sans"/>
+            </a:endParaRPr>
+          </a:p>
+        </p:txBody>
+      </p:sp>
+      <p:cxnSp>
+        <p:nvCxnSpPr>
+          <p:cNvPr id="157" name="Google Shape;157;p22"/>
+          <p:cNvCxnSpPr>
+            <a:endCxn id="156" idx="1"/>
+          </p:cNvCxnSpPr>
+          <p:nvPr/>
+        </p:nvCxnSpPr>
+        <p:spPr>
+          <a:xfrm flipH="1" rot="10800000">
+            <a:off x="3271125" y="3869050"/>
+            <a:ext cx="1943100" cy="109800"/>
+          </a:xfrm>
+          <a:prstGeom prst="straightConnector1">
+            <a:avLst/>
+          </a:prstGeom>
+          <a:noFill/>
+          <a:ln cap="flat" cmpd="sng" w="9525">
+            <a:solidFill>
+              <a:schemeClr val="dk2"/>
+            </a:solidFill>
+            <a:prstDash val="solid"/>
+            <a:round/>
+            <a:headEnd len="med" w="med" type="none"/>
+            <a:tailEnd len="med" w="med" type="triangle"/>
+          </a:ln>
+        </p:spPr>
+      </p:cxnSp>
+      <p:sp>
+        <p:nvSpPr>
+          <p:cNvPr id="158" name="Google Shape;158;p22"/>
+          <p:cNvSpPr txBox="1"/>
+          <p:nvPr/>
+        </p:nvSpPr>
+        <p:spPr>
+          <a:xfrm>
+            <a:off x="5905475" y="277575"/>
+            <a:ext cx="3048000" cy="738900"/>
+          </a:xfrm>
+          <a:prstGeom prst="rect">
+            <a:avLst/>
+          </a:prstGeom>
+          <a:noFill/>
+          <a:ln>
+            <a:noFill/>
+          </a:ln>
+        </p:spPr>
+        <p:txBody>
+          <a:bodyPr anchorCtr="0" anchor="t" bIns="91425" lIns="91425" spcFirstLastPara="1" rIns="91425" wrap="square" tIns="91425">
+            <a:spAutoFit/>
+          </a:bodyPr>
+          <a:lstStyle/>
+          <a:p>
+            <a:pPr indent="0" lvl="0" marL="0" rtl="0" algn="l">
+              <a:spcBef>
+                <a:spcPts val="0"/>
+              </a:spcBef>
+              <a:spcAft>
+                <a:spcPts val="0"/>
+              </a:spcAft>
+              <a:buNone/>
+            </a:pPr>
+            <a:r>
+              <a:rPr lang="es" sz="1800">
+                <a:solidFill>
+                  <a:schemeClr val="dk1"/>
+                </a:solidFill>
+                <a:highlight>
+                  <a:srgbClr val="FFFF00"/>
+                </a:highlight>
+                <a:latin typeface="Open Sans"/>
+                <a:ea typeface="Open Sans"/>
+                <a:cs typeface="Open Sans"/>
+                <a:sym typeface="Open Sans"/>
+              </a:rPr>
+              <a:t>every worker process a range of rows</a:t>
+            </a:r>
+            <a:endParaRPr sz="1800">
+              <a:solidFill>
+                <a:schemeClr val="dk1"/>
+              </a:solidFill>
+              <a:highlight>
+                <a:srgbClr val="FFFF00"/>
+              </a:highlight>
+              <a:latin typeface="Open Sans"/>
+              <a:ea typeface="Open Sans"/>
+              <a:cs typeface="Open Sans"/>
+              <a:sym typeface="Open Sans"/>
+            </a:endParaRPr>
+          </a:p>
+        </p:txBody>
+      </p:sp>
+      <p:cxnSp>
+        <p:nvCxnSpPr>
+          <p:cNvPr id="159" name="Google Shape;159;p22"/>
+          <p:cNvCxnSpPr/>
+          <p:nvPr/>
+        </p:nvCxnSpPr>
+        <p:spPr>
+          <a:xfrm>
+            <a:off x="4686300" y="429975"/>
+            <a:ext cx="1306200" cy="10800"/>
+          </a:xfrm>
+          <a:prstGeom prst="straightConnector1">
+            <a:avLst/>
+          </a:prstGeom>
+          <a:noFill/>
+          <a:ln cap="flat" cmpd="sng" w="9525">
+            <a:solidFill>
+              <a:schemeClr val="dk2"/>
+            </a:solidFill>
+            <a:prstDash val="solid"/>
+            <a:round/>
+            <a:headEnd len="med" w="med" type="none"/>
+            <a:tailEnd len="med" w="med" type="triangle"/>
+          </a:ln>
+        </p:spPr>
+      </p:cxnSp>
+    </p:spTree>
+  </p:cSld>
+  <p:clrMapOvr>
+    <a:masterClrMapping/>
+  </p:clrMapOvr>
+</p:sld>
+</file>
+
+<file path=ppt/slides/slide11.xml><?xml version="1.0" encoding="utf-8"?>
+<p:sld xmlns:a="http://schemas.openxmlformats.org/drawingml/2006/main" xmlns:r="http://schemas.openxmlformats.org/officeDocument/2006/relationships" xmlns:mc="http://schemas.openxmlformats.org/markup-compatibility/2006" xmlns:mv="urn:schemas-microsoft-com:mac:vml" xmlns:p="http://schemas.openxmlformats.org/presentationml/2006/main" xmlns:c="http://schemas.openxmlformats.org/drawingml/2006/chart" xmlns:dgm="http://schemas.openxmlformats.org/drawingml/2006/diagram" xmlns:o="urn:schemas-microsoft-com:office:office" xmlns:v="urn:schemas-microsoft-com:vml" xmlns:pvml="urn:schemas-microsoft-com:office:powerpoint" xmlns:com="http://schemas.openxmlformats.org/drawingml/2006/compatibility" xmlns:p14="http://schemas.microsoft.com/office/powerpoint/2010/main" xmlns:p15="http://schemas.microsoft.com/office/powerpoint/2012/main" xmlns:ahyp="http://schemas.microsoft.com/office/drawing/2018/hyperlinkcolor">
+  <p:cSld>
+    <p:spTree>
+      <p:nvGrpSpPr>
+        <p:cNvPr id="163" name="Shape 163"/>
         <p:cNvGrpSpPr/>
         <p:nvPr/>
       </p:nvGrpSpPr>
@@ -7590,7 +8338,7 @@
       </p:grpSpPr>
       <p:pic>
         <p:nvPicPr>
-          <p:cNvPr id="154" name="Google Shape;154;p22"/>
+          <p:cNvPr id="164" name="Google Shape;164;p23"/>
           <p:cNvPicPr preferRelativeResize="0"/>
           <p:nvPr/>
         </p:nvPicPr>
@@ -7618,7 +8366,7 @@
       </p:pic>
       <p:pic>
         <p:nvPicPr>
-          <p:cNvPr id="155" name="Google Shape;155;p22"/>
+          <p:cNvPr id="165" name="Google Shape;165;p23"/>
           <p:cNvPicPr preferRelativeResize="0"/>
           <p:nvPr/>
         </p:nvPicPr>
@@ -7646,7 +8394,7 @@
       </p:pic>
       <p:sp>
         <p:nvSpPr>
-          <p:cNvPr id="156" name="Google Shape;156;p22"/>
+          <p:cNvPr id="166" name="Google Shape;166;p23"/>
           <p:cNvSpPr txBox="1"/>
           <p:nvPr>
             <p:ph type="title"/>
@@ -7686,7 +8434,7 @@
       </p:sp>
       <p:pic>
         <p:nvPicPr>
-          <p:cNvPr id="157" name="Google Shape;157;p22"/>
+          <p:cNvPr id="167" name="Google Shape;167;p23"/>
           <p:cNvPicPr preferRelativeResize="0"/>
           <p:nvPr/>
         </p:nvPicPr>
@@ -7720,12 +8468,12 @@
 </p:sld>
 </file>
 
-<file path=ppt/slides/slide11.xml><?xml version="1.0" encoding="utf-8"?>
+<file path=ppt/slides/slide12.xml><?xml version="1.0" encoding="utf-8"?>
 <p:sld xmlns:a="http://schemas.openxmlformats.org/drawingml/2006/main" xmlns:r="http://schemas.openxmlformats.org/officeDocument/2006/relationships" xmlns:mc="http://schemas.openxmlformats.org/markup-compatibility/2006" xmlns:mv="urn:schemas-microsoft-com:mac:vml" xmlns:p="http://schemas.openxmlformats.org/presentationml/2006/main" xmlns:c="http://schemas.openxmlformats.org/drawingml/2006/chart" xmlns:dgm="http://schemas.openxmlformats.org/drawingml/2006/diagram" xmlns:o="urn:schemas-microsoft-com:office:office" xmlns:v="urn:schemas-microsoft-com:vml" xmlns:pvml="urn:schemas-microsoft-com:office:powerpoint" xmlns:com="http://schemas.openxmlformats.org/drawingml/2006/compatibility" xmlns:p14="http://schemas.microsoft.com/office/powerpoint/2010/main" xmlns:p15="http://schemas.microsoft.com/office/powerpoint/2012/main" xmlns:ahyp="http://schemas.microsoft.com/office/drawing/2018/hyperlinkcolor">
   <p:cSld>
     <p:spTree>
       <p:nvGrpSpPr>
-        <p:cNvPr id="161" name="Shape 161"/>
+        <p:cNvPr id="171" name="Shape 171"/>
         <p:cNvGrpSpPr/>
         <p:nvPr/>
       </p:nvGrpSpPr>
@@ -7739,7 +8487,7 @@
       </p:grpSpPr>
       <p:sp>
         <p:nvSpPr>
-          <p:cNvPr id="162" name="Google Shape;162;p23"/>
+          <p:cNvPr id="172" name="Google Shape;172;p24"/>
           <p:cNvSpPr txBox="1"/>
           <p:nvPr>
             <p:ph type="ctrTitle"/>
@@ -7779,7 +8527,7 @@
       </p:sp>
       <p:sp>
         <p:nvSpPr>
-          <p:cNvPr id="163" name="Google Shape;163;p23"/>
+          <p:cNvPr id="173" name="Google Shape;173;p24"/>
           <p:cNvSpPr txBox="1"/>
           <p:nvPr>
             <p:ph idx="1" type="subTitle"/>
@@ -7825,12 +8573,12 @@
 </p:sld>
 </file>
 
-<file path=ppt/slides/slide12.xml><?xml version="1.0" encoding="utf-8"?>
+<file path=ppt/slides/slide13.xml><?xml version="1.0" encoding="utf-8"?>
 <p:sld xmlns:a="http://schemas.openxmlformats.org/drawingml/2006/main" xmlns:r="http://schemas.openxmlformats.org/officeDocument/2006/relationships" xmlns:mc="http://schemas.openxmlformats.org/markup-compatibility/2006" xmlns:mv="urn:schemas-microsoft-com:mac:vml" xmlns:p="http://schemas.openxmlformats.org/presentationml/2006/main" xmlns:c="http://schemas.openxmlformats.org/drawingml/2006/chart" xmlns:dgm="http://schemas.openxmlformats.org/drawingml/2006/diagram" xmlns:o="urn:schemas-microsoft-com:office:office" xmlns:v="urn:schemas-microsoft-com:vml" xmlns:pvml="urn:schemas-microsoft-com:office:powerpoint" xmlns:com="http://schemas.openxmlformats.org/drawingml/2006/compatibility" xmlns:p14="http://schemas.microsoft.com/office/powerpoint/2010/main" xmlns:p15="http://schemas.microsoft.com/office/powerpoint/2012/main" xmlns:ahyp="http://schemas.microsoft.com/office/drawing/2018/hyperlinkcolor">
   <p:cSld>
     <p:spTree>
       <p:nvGrpSpPr>
-        <p:cNvPr id="167" name="Shape 167"/>
+        <p:cNvPr id="177" name="Shape 177"/>
         <p:cNvGrpSpPr/>
         <p:nvPr/>
       </p:nvGrpSpPr>
@@ -7844,7 +8592,7 @@
       </p:grpSpPr>
       <p:sp>
         <p:nvSpPr>
-          <p:cNvPr id="168" name="Google Shape;168;p24"/>
+          <p:cNvPr id="178" name="Google Shape;178;p25"/>
           <p:cNvSpPr txBox="1"/>
           <p:nvPr>
             <p:ph type="title"/>
@@ -7884,7 +8632,7 @@
       </p:sp>
       <p:pic>
         <p:nvPicPr>
-          <p:cNvPr id="169" name="Google Shape;169;p24"/>
+          <p:cNvPr id="179" name="Google Shape;179;p25"/>
           <p:cNvPicPr preferRelativeResize="0"/>
           <p:nvPr/>
         </p:nvPicPr>
@@ -7912,7 +8660,7 @@
       </p:pic>
       <p:sp>
         <p:nvSpPr>
-          <p:cNvPr id="170" name="Google Shape;170;p24"/>
+          <p:cNvPr id="180" name="Google Shape;180;p25"/>
           <p:cNvSpPr txBox="1"/>
           <p:nvPr/>
         </p:nvSpPr>
@@ -8034,12 +8782,12 @@
 </p:sld>
 </file>
 
-<file path=ppt/slides/slide13.xml><?xml version="1.0" encoding="utf-8"?>
+<file path=ppt/slides/slide14.xml><?xml version="1.0" encoding="utf-8"?>
 <p:sld xmlns:a="http://schemas.openxmlformats.org/drawingml/2006/main" xmlns:r="http://schemas.openxmlformats.org/officeDocument/2006/relationships" xmlns:mc="http://schemas.openxmlformats.org/markup-compatibility/2006" xmlns:mv="urn:schemas-microsoft-com:mac:vml" xmlns:p="http://schemas.openxmlformats.org/presentationml/2006/main" xmlns:c="http://schemas.openxmlformats.org/drawingml/2006/chart" xmlns:dgm="http://schemas.openxmlformats.org/drawingml/2006/diagram" xmlns:o="urn:schemas-microsoft-com:office:office" xmlns:v="urn:schemas-microsoft-com:vml" xmlns:pvml="urn:schemas-microsoft-com:office:powerpoint" xmlns:com="http://schemas.openxmlformats.org/drawingml/2006/compatibility" xmlns:p14="http://schemas.microsoft.com/office/powerpoint/2010/main" xmlns:p15="http://schemas.microsoft.com/office/powerpoint/2012/main" xmlns:ahyp="http://schemas.microsoft.com/office/drawing/2018/hyperlinkcolor">
   <p:cSld>
     <p:spTree>
       <p:nvGrpSpPr>
-        <p:cNvPr id="174" name="Shape 174"/>
+        <p:cNvPr id="184" name="Shape 184"/>
         <p:cNvGrpSpPr/>
         <p:nvPr/>
       </p:nvGrpSpPr>
@@ -8053,7 +8801,7 @@
       </p:grpSpPr>
       <p:sp>
         <p:nvSpPr>
-          <p:cNvPr id="175" name="Google Shape;175;p25"/>
+          <p:cNvPr id="185" name="Google Shape;185;p26"/>
           <p:cNvSpPr txBox="1"/>
           <p:nvPr>
             <p:ph type="title"/>
@@ -8093,7 +8841,7 @@
       </p:sp>
       <p:sp>
         <p:nvSpPr>
-          <p:cNvPr id="176" name="Google Shape;176;p25"/>
+          <p:cNvPr id="186" name="Google Shape;186;p26"/>
           <p:cNvSpPr txBox="1"/>
           <p:nvPr/>
         </p:nvSpPr>
@@ -8151,7 +8899,7 @@
       </p:sp>
       <p:cxnSp>
         <p:nvCxnSpPr>
-          <p:cNvPr id="177" name="Google Shape;177;p25"/>
+          <p:cNvPr id="187" name="Google Shape;187;p26"/>
           <p:cNvCxnSpPr/>
           <p:nvPr/>
         </p:nvCxnSpPr>
@@ -8177,7 +8925,7 @@
       </p:cxnSp>
       <p:cxnSp>
         <p:nvCxnSpPr>
-          <p:cNvPr id="178" name="Google Shape;178;p25"/>
+          <p:cNvPr id="188" name="Google Shape;188;p26"/>
           <p:cNvCxnSpPr/>
           <p:nvPr/>
         </p:nvCxnSpPr>
@@ -8203,7 +8951,7 @@
       </p:cxnSp>
       <p:sp>
         <p:nvSpPr>
-          <p:cNvPr id="179" name="Google Shape;179;p25"/>
+          <p:cNvPr id="189" name="Google Shape;189;p26"/>
           <p:cNvSpPr txBox="1"/>
           <p:nvPr/>
         </p:nvSpPr>
@@ -8261,7 +9009,7 @@
       </p:sp>
       <p:sp>
         <p:nvSpPr>
-          <p:cNvPr id="180" name="Google Shape;180;p25"/>
+          <p:cNvPr id="190" name="Google Shape;190;p26"/>
           <p:cNvSpPr txBox="1"/>
           <p:nvPr/>
         </p:nvSpPr>
@@ -8319,7 +9067,7 @@
       </p:sp>
       <p:pic>
         <p:nvPicPr>
-          <p:cNvPr id="181" name="Google Shape;181;p25"/>
+          <p:cNvPr id="191" name="Google Shape;191;p26"/>
           <p:cNvPicPr preferRelativeResize="0"/>
           <p:nvPr/>
         </p:nvPicPr>
@@ -8347,7 +9095,7 @@
       </p:pic>
       <p:pic>
         <p:nvPicPr>
-          <p:cNvPr id="182" name="Google Shape;182;p25"/>
+          <p:cNvPr id="192" name="Google Shape;192;p26"/>
           <p:cNvPicPr preferRelativeResize="0"/>
           <p:nvPr/>
         </p:nvPicPr>
@@ -8375,7 +9123,7 @@
       </p:pic>
       <p:cxnSp>
         <p:nvCxnSpPr>
-          <p:cNvPr id="183" name="Google Shape;183;p25"/>
+          <p:cNvPr id="193" name="Google Shape;193;p26"/>
           <p:cNvCxnSpPr/>
           <p:nvPr/>
         </p:nvCxnSpPr>
@@ -8401,7 +9149,7 @@
       </p:cxnSp>
       <p:cxnSp>
         <p:nvCxnSpPr>
-          <p:cNvPr id="184" name="Google Shape;184;p25"/>
+          <p:cNvPr id="194" name="Google Shape;194;p26"/>
           <p:cNvCxnSpPr/>
           <p:nvPr/>
         </p:nvCxnSpPr>
@@ -10697,9 +11445,73 @@
           </a:p>
         </p:txBody>
       </p:sp>
+      <p:sp>
+        <p:nvSpPr>
+          <p:cNvPr id="111" name="Google Shape;111;p17"/>
+          <p:cNvSpPr txBox="1"/>
+          <p:nvPr/>
+        </p:nvSpPr>
+        <p:spPr>
+          <a:xfrm>
+            <a:off x="5696650" y="1444425"/>
+            <a:ext cx="2939100" cy="738900"/>
+          </a:xfrm>
+          <a:prstGeom prst="rect">
+            <a:avLst/>
+          </a:prstGeom>
+          <a:noFill/>
+          <a:ln>
+            <a:noFill/>
+          </a:ln>
+        </p:spPr>
+        <p:txBody>
+          <a:bodyPr anchorCtr="0" anchor="t" bIns="91425" lIns="91425" spcFirstLastPara="1" rIns="91425" wrap="square" tIns="91425">
+            <a:spAutoFit/>
+          </a:bodyPr>
+          <a:lstStyle/>
+          <a:p>
+            <a:pPr indent="0" lvl="0" marL="0" rtl="0" algn="l">
+              <a:spcBef>
+                <a:spcPts val="0"/>
+              </a:spcBef>
+              <a:spcAft>
+                <a:spcPts val="0"/>
+              </a:spcAft>
+              <a:buNone/>
+            </a:pPr>
+            <a:r>
+              <a:rPr lang="es" sz="1800">
+                <a:solidFill>
+                  <a:schemeClr val="dk1"/>
+                </a:solidFill>
+                <a:highlight>
+                  <a:srgbClr val="FFFF00"/>
+                </a:highlight>
+                <a:latin typeface="Open Sans"/>
+                <a:ea typeface="Open Sans"/>
+                <a:cs typeface="Open Sans"/>
+                <a:sym typeface="Open Sans"/>
+              </a:rPr>
+              <a:t>Process dont return a value by default</a:t>
+            </a:r>
+            <a:endParaRPr sz="1800">
+              <a:solidFill>
+                <a:schemeClr val="dk1"/>
+              </a:solidFill>
+              <a:highlight>
+                <a:srgbClr val="FFFF00"/>
+              </a:highlight>
+              <a:latin typeface="Open Sans"/>
+              <a:ea typeface="Open Sans"/>
+              <a:cs typeface="Open Sans"/>
+              <a:sym typeface="Open Sans"/>
+            </a:endParaRPr>
+          </a:p>
+        </p:txBody>
+      </p:sp>
       <p:pic>
         <p:nvPicPr>
-          <p:cNvPr id="111" name="Google Shape;111;p17"/>
+          <p:cNvPr id="112" name="Google Shape;112;p17"/>
           <p:cNvPicPr preferRelativeResize="0"/>
           <p:nvPr/>
         </p:nvPicPr>
@@ -10713,8 +11525,8 @@
         </p:blipFill>
         <p:spPr>
           <a:xfrm>
-            <a:off x="378875" y="1199575"/>
-            <a:ext cx="4919071" cy="3232025"/>
+            <a:off x="194900" y="1147225"/>
+            <a:ext cx="5149400" cy="3751610"/>
           </a:xfrm>
           <a:prstGeom prst="rect">
             <a:avLst/>
@@ -10727,7 +11539,7 @@
       </p:pic>
       <p:pic>
         <p:nvPicPr>
-          <p:cNvPr id="112" name="Google Shape;112;p17"/>
+          <p:cNvPr id="113" name="Google Shape;113;p17"/>
           <p:cNvPicPr preferRelativeResize="0"/>
           <p:nvPr/>
         </p:nvPicPr>
@@ -10741,8 +11553,8 @@
         </p:blipFill>
         <p:spPr>
           <a:xfrm>
-            <a:off x="3919225" y="3290425"/>
-            <a:ext cx="5149400" cy="1712175"/>
+            <a:off x="5472400" y="2238550"/>
+            <a:ext cx="3494899" cy="2357151"/>
           </a:xfrm>
           <a:prstGeom prst="rect">
             <a:avLst/>
@@ -10766,7 +11578,7 @@
   <p:cSld>
     <p:spTree>
       <p:nvGrpSpPr>
-        <p:cNvPr id="116" name="Shape 116"/>
+        <p:cNvPr id="117" name="Shape 117"/>
         <p:cNvGrpSpPr/>
         <p:nvPr/>
       </p:nvGrpSpPr>
@@ -10780,7 +11592,220 @@
       </p:grpSpPr>
       <p:sp>
         <p:nvSpPr>
-          <p:cNvPr id="117" name="Google Shape;117;p18"/>
+          <p:cNvPr id="118" name="Google Shape;118;p18"/>
+          <p:cNvSpPr txBox="1"/>
+          <p:nvPr>
+            <p:ph type="title"/>
+          </p:nvPr>
+        </p:nvSpPr>
+        <p:spPr>
+          <a:xfrm>
+            <a:off x="311700" y="315925"/>
+            <a:ext cx="8520600" cy="831300"/>
+          </a:xfrm>
+          <a:prstGeom prst="rect">
+            <a:avLst/>
+          </a:prstGeom>
+        </p:spPr>
+        <p:txBody>
+          <a:bodyPr anchorCtr="0" anchor="b" bIns="91425" lIns="91425" spcFirstLastPara="1" rIns="91425" wrap="square" tIns="91425">
+            <a:normAutofit/>
+          </a:bodyPr>
+          <a:lstStyle/>
+          <a:p>
+            <a:pPr indent="0" lvl="0" marL="0" rtl="0" algn="l">
+              <a:spcBef>
+                <a:spcPts val="0"/>
+              </a:spcBef>
+              <a:spcAft>
+                <a:spcPts val="0"/>
+              </a:spcAft>
+              <a:buNone/>
+            </a:pPr>
+            <a:r>
+              <a:rPr lang="es"/>
+              <a:t>parallel executions in python with return value</a:t>
+            </a:r>
+            <a:endParaRPr/>
+          </a:p>
+        </p:txBody>
+      </p:sp>
+      <p:sp>
+        <p:nvSpPr>
+          <p:cNvPr id="119" name="Google Shape;119;p18"/>
+          <p:cNvSpPr txBox="1"/>
+          <p:nvPr/>
+        </p:nvSpPr>
+        <p:spPr>
+          <a:xfrm>
+            <a:off x="4307875" y="1401900"/>
+            <a:ext cx="2939100" cy="738900"/>
+          </a:xfrm>
+          <a:prstGeom prst="rect">
+            <a:avLst/>
+          </a:prstGeom>
+          <a:noFill/>
+          <a:ln>
+            <a:noFill/>
+          </a:ln>
+        </p:spPr>
+        <p:txBody>
+          <a:bodyPr anchorCtr="0" anchor="t" bIns="91425" lIns="91425" spcFirstLastPara="1" rIns="91425" wrap="square" tIns="91425">
+            <a:spAutoFit/>
+          </a:bodyPr>
+          <a:lstStyle/>
+          <a:p>
+            <a:pPr indent="0" lvl="0" marL="0" rtl="0" algn="l">
+              <a:spcBef>
+                <a:spcPts val="0"/>
+              </a:spcBef>
+              <a:spcAft>
+                <a:spcPts val="0"/>
+              </a:spcAft>
+              <a:buNone/>
+            </a:pPr>
+            <a:r>
+              <a:rPr lang="es" sz="1800">
+                <a:solidFill>
+                  <a:schemeClr val="dk1"/>
+                </a:solidFill>
+                <a:highlight>
+                  <a:srgbClr val="FFFF00"/>
+                </a:highlight>
+                <a:latin typeface="Open Sans"/>
+                <a:ea typeface="Open Sans"/>
+                <a:cs typeface="Open Sans"/>
+                <a:sym typeface="Open Sans"/>
+              </a:rPr>
+              <a:t>The values are collected by a collection (Queue) </a:t>
+            </a:r>
+            <a:endParaRPr sz="1800">
+              <a:solidFill>
+                <a:schemeClr val="dk1"/>
+              </a:solidFill>
+              <a:highlight>
+                <a:srgbClr val="FFFF00"/>
+              </a:highlight>
+              <a:latin typeface="Open Sans"/>
+              <a:ea typeface="Open Sans"/>
+              <a:cs typeface="Open Sans"/>
+              <a:sym typeface="Open Sans"/>
+            </a:endParaRPr>
+          </a:p>
+        </p:txBody>
+      </p:sp>
+      <p:pic>
+        <p:nvPicPr>
+          <p:cNvPr id="120" name="Google Shape;120;p18"/>
+          <p:cNvPicPr preferRelativeResize="0"/>
+          <p:nvPr/>
+        </p:nvPicPr>
+        <p:blipFill>
+          <a:blip r:embed="rId3">
+            <a:alphaModFix/>
+          </a:blip>
+          <a:stretch>
+            <a:fillRect/>
+          </a:stretch>
+        </p:blipFill>
+        <p:spPr>
+          <a:xfrm>
+            <a:off x="352800" y="1147225"/>
+            <a:ext cx="3614425" cy="3577543"/>
+          </a:xfrm>
+          <a:prstGeom prst="rect">
+            <a:avLst/>
+          </a:prstGeom>
+          <a:noFill/>
+          <a:ln>
+            <a:noFill/>
+          </a:ln>
+        </p:spPr>
+      </p:pic>
+      <p:pic>
+        <p:nvPicPr>
+          <p:cNvPr id="121" name="Google Shape;121;p18"/>
+          <p:cNvPicPr preferRelativeResize="0"/>
+          <p:nvPr/>
+        </p:nvPicPr>
+        <p:blipFill>
+          <a:blip r:embed="rId4">
+            <a:alphaModFix/>
+          </a:blip>
+          <a:stretch>
+            <a:fillRect/>
+          </a:stretch>
+        </p:blipFill>
+        <p:spPr>
+          <a:xfrm>
+            <a:off x="4307875" y="2189975"/>
+            <a:ext cx="4864384" cy="2509650"/>
+          </a:xfrm>
+          <a:prstGeom prst="rect">
+            <a:avLst/>
+          </a:prstGeom>
+          <a:noFill/>
+          <a:ln>
+            <a:noFill/>
+          </a:ln>
+        </p:spPr>
+      </p:pic>
+      <p:cxnSp>
+        <p:nvCxnSpPr>
+          <p:cNvPr id="122" name="Google Shape;122;p18"/>
+          <p:cNvCxnSpPr>
+            <a:endCxn id="119" idx="1"/>
+          </p:cNvCxnSpPr>
+          <p:nvPr/>
+        </p:nvCxnSpPr>
+        <p:spPr>
+          <a:xfrm>
+            <a:off x="2199475" y="1271850"/>
+            <a:ext cx="2108400" cy="499500"/>
+          </a:xfrm>
+          <a:prstGeom prst="straightConnector1">
+            <a:avLst/>
+          </a:prstGeom>
+          <a:noFill/>
+          <a:ln cap="flat" cmpd="sng" w="9525">
+            <a:solidFill>
+              <a:schemeClr val="dk2"/>
+            </a:solidFill>
+            <a:prstDash val="solid"/>
+            <a:round/>
+            <a:headEnd len="med" w="med" type="none"/>
+            <a:tailEnd len="med" w="med" type="triangle"/>
+          </a:ln>
+        </p:spPr>
+      </p:cxnSp>
+    </p:spTree>
+  </p:cSld>
+  <p:clrMapOvr>
+    <a:masterClrMapping/>
+  </p:clrMapOvr>
+</p:sld>
+</file>
+
+<file path=ppt/slides/slide7.xml><?xml version="1.0" encoding="utf-8"?>
+<p:sld xmlns:a="http://schemas.openxmlformats.org/drawingml/2006/main" xmlns:r="http://schemas.openxmlformats.org/officeDocument/2006/relationships" xmlns:mc="http://schemas.openxmlformats.org/markup-compatibility/2006" xmlns:mv="urn:schemas-microsoft-com:mac:vml" xmlns:p="http://schemas.openxmlformats.org/presentationml/2006/main" xmlns:c="http://schemas.openxmlformats.org/drawingml/2006/chart" xmlns:dgm="http://schemas.openxmlformats.org/drawingml/2006/diagram" xmlns:o="urn:schemas-microsoft-com:office:office" xmlns:v="urn:schemas-microsoft-com:vml" xmlns:pvml="urn:schemas-microsoft-com:office:powerpoint" xmlns:com="http://schemas.openxmlformats.org/drawingml/2006/compatibility" xmlns:p14="http://schemas.microsoft.com/office/powerpoint/2010/main" xmlns:p15="http://schemas.microsoft.com/office/powerpoint/2012/main" xmlns:ahyp="http://schemas.microsoft.com/office/drawing/2018/hyperlinkcolor">
+  <p:cSld>
+    <p:spTree>
+      <p:nvGrpSpPr>
+        <p:cNvPr id="126" name="Shape 126"/>
+        <p:cNvGrpSpPr/>
+        <p:nvPr/>
+      </p:nvGrpSpPr>
+      <p:grpSpPr>
+        <a:xfrm>
+          <a:off x="0" y="0"/>
+          <a:ext cx="0" cy="0"/>
+          <a:chOff x="0" y="0"/>
+          <a:chExt cx="0" cy="0"/>
+        </a:xfrm>
+      </p:grpSpPr>
+      <p:sp>
+        <p:nvSpPr>
+          <p:cNvPr id="127" name="Google Shape;127;p19"/>
           <p:cNvSpPr txBox="1"/>
           <p:nvPr>
             <p:ph type="title"/>
@@ -10820,7 +11845,7 @@
       </p:sp>
       <p:sp>
         <p:nvSpPr>
-          <p:cNvPr id="118" name="Google Shape;118;p18"/>
+          <p:cNvPr id="128" name="Google Shape;128;p19"/>
           <p:cNvSpPr txBox="1"/>
           <p:nvPr/>
         </p:nvSpPr>
@@ -11205,7 +12230,7 @@
       </p:sp>
       <p:sp>
         <p:nvSpPr>
-          <p:cNvPr id="119" name="Google Shape;119;p18"/>
+          <p:cNvPr id="129" name="Google Shape;129;p19"/>
           <p:cNvSpPr txBox="1"/>
           <p:nvPr/>
         </p:nvSpPr>
@@ -11429,7 +12454,7 @@
       </p:sp>
       <p:pic>
         <p:nvPicPr>
-          <p:cNvPr id="120" name="Google Shape;120;p18"/>
+          <p:cNvPr id="130" name="Google Shape;130;p19"/>
           <p:cNvPicPr preferRelativeResize="0"/>
           <p:nvPr/>
         </p:nvPicPr>
@@ -11445,131 +12470,6 @@
           <a:xfrm>
             <a:off x="5926100" y="2394925"/>
             <a:ext cx="1698100" cy="1698100"/>
-          </a:xfrm>
-          <a:prstGeom prst="rect">
-            <a:avLst/>
-          </a:prstGeom>
-          <a:noFill/>
-          <a:ln>
-            <a:noFill/>
-          </a:ln>
-        </p:spPr>
-      </p:pic>
-    </p:spTree>
-  </p:cSld>
-  <p:clrMapOvr>
-    <a:masterClrMapping/>
-  </p:clrMapOvr>
-</p:sld>
-</file>
-
-<file path=ppt/slides/slide7.xml><?xml version="1.0" encoding="utf-8"?>
-<p:sld xmlns:a="http://schemas.openxmlformats.org/drawingml/2006/main" xmlns:r="http://schemas.openxmlformats.org/officeDocument/2006/relationships" xmlns:mc="http://schemas.openxmlformats.org/markup-compatibility/2006" xmlns:mv="urn:schemas-microsoft-com:mac:vml" xmlns:p="http://schemas.openxmlformats.org/presentationml/2006/main" xmlns:c="http://schemas.openxmlformats.org/drawingml/2006/chart" xmlns:dgm="http://schemas.openxmlformats.org/drawingml/2006/diagram" xmlns:o="urn:schemas-microsoft-com:office:office" xmlns:v="urn:schemas-microsoft-com:vml" xmlns:pvml="urn:schemas-microsoft-com:office:powerpoint" xmlns:com="http://schemas.openxmlformats.org/drawingml/2006/compatibility" xmlns:p14="http://schemas.microsoft.com/office/powerpoint/2010/main" xmlns:p15="http://schemas.microsoft.com/office/powerpoint/2012/main" xmlns:ahyp="http://schemas.microsoft.com/office/drawing/2018/hyperlinkcolor">
-  <p:cSld>
-    <p:spTree>
-      <p:nvGrpSpPr>
-        <p:cNvPr id="124" name="Shape 124"/>
-        <p:cNvGrpSpPr/>
-        <p:nvPr/>
-      </p:nvGrpSpPr>
-      <p:grpSpPr>
-        <a:xfrm>
-          <a:off x="0" y="0"/>
-          <a:ext cx="0" cy="0"/>
-          <a:chOff x="0" y="0"/>
-          <a:chExt cx="0" cy="0"/>
-        </a:xfrm>
-      </p:grpSpPr>
-      <p:sp>
-        <p:nvSpPr>
-          <p:cNvPr id="125" name="Google Shape;125;p19"/>
-          <p:cNvSpPr txBox="1"/>
-          <p:nvPr>
-            <p:ph type="title"/>
-          </p:nvPr>
-        </p:nvSpPr>
-        <p:spPr>
-          <a:xfrm>
-            <a:off x="311700" y="-201375"/>
-            <a:ext cx="8520600" cy="2302200"/>
-          </a:xfrm>
-          <a:prstGeom prst="rect">
-            <a:avLst/>
-          </a:prstGeom>
-        </p:spPr>
-        <p:txBody>
-          <a:bodyPr anchorCtr="0" anchor="b" bIns="91425" lIns="91425" spcFirstLastPara="1" rIns="91425" wrap="square" tIns="91425">
-            <a:normAutofit/>
-          </a:bodyPr>
-          <a:lstStyle/>
-          <a:p>
-            <a:pPr indent="0" lvl="0" marL="0" rtl="0" algn="l">
-              <a:spcBef>
-                <a:spcPts val="0"/>
-              </a:spcBef>
-              <a:spcAft>
-                <a:spcPts val="0"/>
-              </a:spcAft>
-              <a:buNone/>
-            </a:pPr>
-            <a:r>
-              <a:rPr lang="es"/>
-              <a:t>Example </a:t>
-            </a:r>
-            <a:endParaRPr/>
-          </a:p>
-          <a:p>
-            <a:pPr indent="0" lvl="0" marL="0" rtl="0" algn="l">
-              <a:spcBef>
-                <a:spcPts val="0"/>
-              </a:spcBef>
-              <a:spcAft>
-                <a:spcPts val="0"/>
-              </a:spcAft>
-              <a:buNone/>
-            </a:pPr>
-            <a:r>
-              <a:rPr lang="es"/>
-              <a:t>single </a:t>
-            </a:r>
-            <a:endParaRPr/>
-          </a:p>
-          <a:p>
-            <a:pPr indent="0" lvl="0" marL="0" rtl="0" algn="l">
-              <a:spcBef>
-                <a:spcPts val="0"/>
-              </a:spcBef>
-              <a:spcAft>
-                <a:spcPts val="0"/>
-              </a:spcAft>
-              <a:buNone/>
-            </a:pPr>
-            <a:r>
-              <a:rPr lang="es"/>
-              <a:t>core </a:t>
-            </a:r>
-            <a:endParaRPr/>
-          </a:p>
-        </p:txBody>
-      </p:sp>
-      <p:pic>
-        <p:nvPicPr>
-          <p:cNvPr id="126" name="Google Shape;126;p19"/>
-          <p:cNvPicPr preferRelativeResize="0"/>
-          <p:nvPr/>
-        </p:nvPicPr>
-        <p:blipFill>
-          <a:blip r:embed="rId3">
-            <a:alphaModFix/>
-          </a:blip>
-          <a:stretch>
-            <a:fillRect/>
-          </a:stretch>
-        </p:blipFill>
-        <p:spPr>
-          <a:xfrm>
-            <a:off x="2667050" y="81500"/>
-            <a:ext cx="5573125" cy="4751751"/>
           </a:xfrm>
           <a:prstGeom prst="rect">
             <a:avLst/>
@@ -11593,7 +12493,7 @@
   <p:cSld>
     <p:spTree>
       <p:nvGrpSpPr>
-        <p:cNvPr id="130" name="Shape 130"/>
+        <p:cNvPr id="134" name="Shape 134"/>
         <p:cNvGrpSpPr/>
         <p:nvPr/>
       </p:nvGrpSpPr>
@@ -11607,7 +12507,7 @@
       </p:grpSpPr>
       <p:sp>
         <p:nvSpPr>
-          <p:cNvPr id="131" name="Google Shape;131;p20"/>
+          <p:cNvPr id="135" name="Google Shape;135;p20"/>
           <p:cNvSpPr txBox="1"/>
           <p:nvPr>
             <p:ph type="title"/>
@@ -11655,7 +12555,7 @@
             </a:pPr>
             <a:r>
               <a:rPr lang="es"/>
-              <a:t>multiple</a:t>
+              <a:t>single </a:t>
             </a:r>
             <a:endParaRPr/>
           </a:p>
@@ -11679,48 +12579,22 @@
       </p:sp>
       <p:pic>
         <p:nvPicPr>
-          <p:cNvPr id="132" name="Google Shape;132;p20"/>
+          <p:cNvPr id="136" name="Google Shape;136;p20"/>
           <p:cNvPicPr preferRelativeResize="0"/>
           <p:nvPr/>
         </p:nvPicPr>
-        <p:blipFill rotWithShape="1">
+        <p:blipFill>
           <a:blip r:embed="rId3">
             <a:alphaModFix/>
           </a:blip>
-          <a:srcRect b="85598" l="0" r="0" t="0"/>
-          <a:stretch/>
+          <a:stretch>
+            <a:fillRect/>
+          </a:stretch>
         </p:blipFill>
         <p:spPr>
           <a:xfrm>
-            <a:off x="2155350" y="380888"/>
-            <a:ext cx="6744300" cy="1137675"/>
-          </a:xfrm>
-          <a:prstGeom prst="rect">
-            <a:avLst/>
-          </a:prstGeom>
-          <a:noFill/>
-          <a:ln>
-            <a:noFill/>
-          </a:ln>
-        </p:spPr>
-      </p:pic>
-      <p:pic>
-        <p:nvPicPr>
-          <p:cNvPr id="133" name="Google Shape;133;p20"/>
-          <p:cNvPicPr preferRelativeResize="0"/>
-          <p:nvPr/>
-        </p:nvPicPr>
-        <p:blipFill rotWithShape="1">
-          <a:blip r:embed="rId3">
-            <a:alphaModFix/>
-          </a:blip>
-          <a:srcRect b="0" l="0" r="0" t="78131"/>
-          <a:stretch/>
-        </p:blipFill>
-        <p:spPr>
-          <a:xfrm>
-            <a:off x="2155350" y="1703603"/>
-            <a:ext cx="6744300" cy="1727572"/>
+            <a:off x="2667050" y="81500"/>
+            <a:ext cx="5573125" cy="4751751"/>
           </a:xfrm>
           <a:prstGeom prst="rect">
             <a:avLst/>
@@ -11744,7 +12618,7 @@
   <p:cSld>
     <p:spTree>
       <p:nvGrpSpPr>
-        <p:cNvPr id="137" name="Shape 137"/>
+        <p:cNvPr id="140" name="Shape 140"/>
         <p:cNvGrpSpPr/>
         <p:nvPr/>
       </p:nvGrpSpPr>
@@ -11758,7 +12632,7 @@
       </p:grpSpPr>
       <p:sp>
         <p:nvSpPr>
-          <p:cNvPr id="138" name="Google Shape;138;p21"/>
+          <p:cNvPr id="141" name="Google Shape;141;p21"/>
           <p:cNvSpPr txBox="1"/>
           <p:nvPr>
             <p:ph type="title"/>
@@ -11830,7 +12704,7 @@
       </p:sp>
       <p:pic>
         <p:nvPicPr>
-          <p:cNvPr id="139" name="Google Shape;139;p21" title="Screenshot 2025-10-21 094736.png"/>
+          <p:cNvPr id="142" name="Google Shape;142;p21"/>
           <p:cNvPicPr preferRelativeResize="0"/>
           <p:nvPr/>
         </p:nvPicPr>
@@ -11838,13 +12712,13 @@
           <a:blip r:embed="rId3">
             <a:alphaModFix/>
           </a:blip>
-          <a:srcRect b="21473" l="0" r="0" t="13515"/>
+          <a:srcRect b="85598" l="0" r="0" t="0"/>
           <a:stretch/>
         </p:blipFill>
         <p:spPr>
           <a:xfrm>
-            <a:off x="2471075" y="277574"/>
-            <a:ext cx="5954199" cy="4533899"/>
+            <a:off x="2155350" y="380888"/>
+            <a:ext cx="6744300" cy="1137675"/>
           </a:xfrm>
           <a:prstGeom prst="rect">
             <a:avLst/>
@@ -11855,16 +12729,23 @@
           </a:ln>
         </p:spPr>
       </p:pic>
-      <p:sp>
-        <p:nvSpPr>
-          <p:cNvPr id="140" name="Google Shape;140;p21"/>
-          <p:cNvSpPr txBox="1"/>
+      <p:pic>
+        <p:nvPicPr>
+          <p:cNvPr id="143" name="Google Shape;143;p21"/>
+          <p:cNvPicPr preferRelativeResize="0"/>
           <p:nvPr/>
-        </p:nvSpPr>
-        <p:spPr>
-          <a:xfrm>
-            <a:off x="5818400" y="1148450"/>
-            <a:ext cx="2422200" cy="738900"/>
+        </p:nvPicPr>
+        <p:blipFill rotWithShape="1">
+          <a:blip r:embed="rId3">
+            <a:alphaModFix/>
+          </a:blip>
+          <a:srcRect b="0" l="0" r="0" t="78131"/>
+          <a:stretch/>
+        </p:blipFill>
+        <p:spPr>
+          <a:xfrm>
+            <a:off x="2155350" y="1703603"/>
+            <a:ext cx="6744300" cy="1727572"/>
           </a:xfrm>
           <a:prstGeom prst="rect">
             <a:avLst/>
@@ -11874,511 +12755,7 @@
             <a:noFill/>
           </a:ln>
         </p:spPr>
-        <p:txBody>
-          <a:bodyPr anchorCtr="0" anchor="t" bIns="91425" lIns="91425" spcFirstLastPara="1" rIns="91425" wrap="square" tIns="91425">
-            <a:spAutoFit/>
-          </a:bodyPr>
-          <a:lstStyle/>
-          <a:p>
-            <a:pPr indent="0" lvl="0" marL="0" rtl="0" algn="l">
-              <a:spcBef>
-                <a:spcPts val="0"/>
-              </a:spcBef>
-              <a:spcAft>
-                <a:spcPts val="0"/>
-              </a:spcAft>
-              <a:buNone/>
-            </a:pPr>
-            <a:r>
-              <a:rPr lang="es" sz="1800">
-                <a:solidFill>
-                  <a:schemeClr val="dk1"/>
-                </a:solidFill>
-                <a:highlight>
-                  <a:srgbClr val="FFFF00"/>
-                </a:highlight>
-                <a:latin typeface="Open Sans"/>
-                <a:ea typeface="Open Sans"/>
-                <a:cs typeface="Open Sans"/>
-                <a:sym typeface="Open Sans"/>
-              </a:rPr>
-              <a:t>split the image rows in N process parts</a:t>
-            </a:r>
-            <a:endParaRPr sz="1800">
-              <a:solidFill>
-                <a:schemeClr val="dk1"/>
-              </a:solidFill>
-              <a:highlight>
-                <a:srgbClr val="FFFF00"/>
-              </a:highlight>
-              <a:latin typeface="Open Sans"/>
-              <a:ea typeface="Open Sans"/>
-              <a:cs typeface="Open Sans"/>
-              <a:sym typeface="Open Sans"/>
-            </a:endParaRPr>
-          </a:p>
-        </p:txBody>
-      </p:sp>
-      <p:cxnSp>
-        <p:nvCxnSpPr>
-          <p:cNvPr id="141" name="Google Shape;141;p21"/>
-          <p:cNvCxnSpPr>
-            <a:endCxn id="140" idx="1"/>
-          </p:cNvCxnSpPr>
-          <p:nvPr/>
-        </p:nvCxnSpPr>
-        <p:spPr>
-          <a:xfrm flipH="1" rot="10800000">
-            <a:off x="4071200" y="1517900"/>
-            <a:ext cx="1747200" cy="207600"/>
-          </a:xfrm>
-          <a:prstGeom prst="straightConnector1">
-            <a:avLst/>
-          </a:prstGeom>
-          <a:noFill/>
-          <a:ln cap="flat" cmpd="sng" w="9525">
-            <a:solidFill>
-              <a:schemeClr val="dk2"/>
-            </a:solidFill>
-            <a:prstDash val="solid"/>
-            <a:round/>
-            <a:headEnd len="med" w="med" type="none"/>
-            <a:tailEnd len="med" w="med" type="triangle"/>
-          </a:ln>
-        </p:spPr>
-      </p:cxnSp>
-      <p:sp>
-        <p:nvSpPr>
-          <p:cNvPr id="142" name="Google Shape;142;p21"/>
-          <p:cNvSpPr txBox="1"/>
-          <p:nvPr/>
-        </p:nvSpPr>
-        <p:spPr>
-          <a:xfrm>
-            <a:off x="5987125" y="2100825"/>
-            <a:ext cx="2939100" cy="738900"/>
-          </a:xfrm>
-          <a:prstGeom prst="rect">
-            <a:avLst/>
-          </a:prstGeom>
-          <a:noFill/>
-          <a:ln>
-            <a:noFill/>
-          </a:ln>
-        </p:spPr>
-        <p:txBody>
-          <a:bodyPr anchorCtr="0" anchor="t" bIns="91425" lIns="91425" spcFirstLastPara="1" rIns="91425" wrap="square" tIns="91425">
-            <a:spAutoFit/>
-          </a:bodyPr>
-          <a:lstStyle/>
-          <a:p>
-            <a:pPr indent="0" lvl="0" marL="0" rtl="0" algn="l">
-              <a:spcBef>
-                <a:spcPts val="0"/>
-              </a:spcBef>
-              <a:spcAft>
-                <a:spcPts val="0"/>
-              </a:spcAft>
-              <a:buNone/>
-            </a:pPr>
-            <a:r>
-              <a:rPr lang="es" sz="1800">
-                <a:solidFill>
-                  <a:schemeClr val="dk1"/>
-                </a:solidFill>
-                <a:highlight>
-                  <a:srgbClr val="FFFF00"/>
-                </a:highlight>
-                <a:latin typeface="Open Sans"/>
-                <a:ea typeface="Open Sans"/>
-                <a:cs typeface="Open Sans"/>
-                <a:sym typeface="Open Sans"/>
-              </a:rPr>
-              <a:t>shared image memory</a:t>
-            </a:r>
-            <a:endParaRPr sz="1800">
-              <a:solidFill>
-                <a:schemeClr val="dk1"/>
-              </a:solidFill>
-              <a:highlight>
-                <a:srgbClr val="FFFF00"/>
-              </a:highlight>
-              <a:latin typeface="Open Sans"/>
-              <a:ea typeface="Open Sans"/>
-              <a:cs typeface="Open Sans"/>
-              <a:sym typeface="Open Sans"/>
-            </a:endParaRPr>
-          </a:p>
-          <a:p>
-            <a:pPr indent="0" lvl="0" marL="0" rtl="0" algn="l">
-              <a:spcBef>
-                <a:spcPts val="0"/>
-              </a:spcBef>
-              <a:spcAft>
-                <a:spcPts val="0"/>
-              </a:spcAft>
-              <a:buNone/>
-            </a:pPr>
-            <a:r>
-              <a:rPr lang="es" sz="1800">
-                <a:solidFill>
-                  <a:schemeClr val="dk1"/>
-                </a:solidFill>
-                <a:highlight>
-                  <a:srgbClr val="FFFF00"/>
-                </a:highlight>
-                <a:latin typeface="Open Sans"/>
-                <a:ea typeface="Open Sans"/>
-                <a:cs typeface="Open Sans"/>
-                <a:sym typeface="Open Sans"/>
-              </a:rPr>
-              <a:t>for every process</a:t>
-            </a:r>
-            <a:endParaRPr sz="1800">
-              <a:solidFill>
-                <a:schemeClr val="dk1"/>
-              </a:solidFill>
-              <a:highlight>
-                <a:srgbClr val="FFFF00"/>
-              </a:highlight>
-              <a:latin typeface="Open Sans"/>
-              <a:ea typeface="Open Sans"/>
-              <a:cs typeface="Open Sans"/>
-              <a:sym typeface="Open Sans"/>
-            </a:endParaRPr>
-          </a:p>
-        </p:txBody>
-      </p:sp>
-      <p:cxnSp>
-        <p:nvCxnSpPr>
-          <p:cNvPr id="143" name="Google Shape;143;p21"/>
-          <p:cNvCxnSpPr>
-            <a:endCxn id="142" idx="1"/>
-          </p:cNvCxnSpPr>
-          <p:nvPr/>
-        </p:nvCxnSpPr>
-        <p:spPr>
-          <a:xfrm>
-            <a:off x="3924325" y="2242575"/>
-            <a:ext cx="2062800" cy="227700"/>
-          </a:xfrm>
-          <a:prstGeom prst="straightConnector1">
-            <a:avLst/>
-          </a:prstGeom>
-          <a:noFill/>
-          <a:ln cap="flat" cmpd="sng" w="9525">
-            <a:solidFill>
-              <a:schemeClr val="dk2"/>
-            </a:solidFill>
-            <a:prstDash val="solid"/>
-            <a:round/>
-            <a:headEnd len="med" w="med" type="none"/>
-            <a:tailEnd len="med" w="med" type="triangle"/>
-          </a:ln>
-        </p:spPr>
-      </p:cxnSp>
-      <p:sp>
-        <p:nvSpPr>
-          <p:cNvPr id="144" name="Google Shape;144;p21"/>
-          <p:cNvSpPr txBox="1"/>
-          <p:nvPr/>
-        </p:nvSpPr>
-        <p:spPr>
-          <a:xfrm>
-            <a:off x="152375" y="2525350"/>
-            <a:ext cx="2939100" cy="738900"/>
-          </a:xfrm>
-          <a:prstGeom prst="rect">
-            <a:avLst/>
-          </a:prstGeom>
-          <a:noFill/>
-          <a:ln>
-            <a:noFill/>
-          </a:ln>
-        </p:spPr>
-        <p:txBody>
-          <a:bodyPr anchorCtr="0" anchor="t" bIns="91425" lIns="91425" spcFirstLastPara="1" rIns="91425" wrap="square" tIns="91425">
-            <a:spAutoFit/>
-          </a:bodyPr>
-          <a:lstStyle/>
-          <a:p>
-            <a:pPr indent="0" lvl="0" marL="0" rtl="0" algn="l">
-              <a:spcBef>
-                <a:spcPts val="0"/>
-              </a:spcBef>
-              <a:spcAft>
-                <a:spcPts val="0"/>
-              </a:spcAft>
-              <a:buNone/>
-            </a:pPr>
-            <a:r>
-              <a:rPr lang="es" sz="1800">
-                <a:solidFill>
-                  <a:schemeClr val="dk1"/>
-                </a:solidFill>
-                <a:highlight>
-                  <a:srgbClr val="FFFF00"/>
-                </a:highlight>
-                <a:latin typeface="Open Sans"/>
-                <a:ea typeface="Open Sans"/>
-                <a:cs typeface="Open Sans"/>
-                <a:sym typeface="Open Sans"/>
-              </a:rPr>
-              <a:t>create workers and </a:t>
-            </a:r>
-            <a:r>
-              <a:rPr lang="es" sz="1800">
-                <a:solidFill>
-                  <a:schemeClr val="dk1"/>
-                </a:solidFill>
-                <a:highlight>
-                  <a:srgbClr val="FFFF00"/>
-                </a:highlight>
-                <a:latin typeface="Open Sans"/>
-                <a:ea typeface="Open Sans"/>
-                <a:cs typeface="Open Sans"/>
-                <a:sym typeface="Open Sans"/>
-              </a:rPr>
-              <a:t>assign</a:t>
-            </a:r>
-            <a:r>
-              <a:rPr lang="es" sz="1800">
-                <a:solidFill>
-                  <a:schemeClr val="dk1"/>
-                </a:solidFill>
-                <a:highlight>
-                  <a:srgbClr val="FFFF00"/>
-                </a:highlight>
-                <a:latin typeface="Open Sans"/>
-                <a:ea typeface="Open Sans"/>
-                <a:cs typeface="Open Sans"/>
-                <a:sym typeface="Open Sans"/>
-              </a:rPr>
-              <a:t> the row range</a:t>
-            </a:r>
-            <a:endParaRPr sz="1800">
-              <a:solidFill>
-                <a:schemeClr val="dk1"/>
-              </a:solidFill>
-              <a:highlight>
-                <a:srgbClr val="FFFF00"/>
-              </a:highlight>
-              <a:latin typeface="Open Sans"/>
-              <a:ea typeface="Open Sans"/>
-              <a:cs typeface="Open Sans"/>
-              <a:sym typeface="Open Sans"/>
-            </a:endParaRPr>
-          </a:p>
-        </p:txBody>
-      </p:sp>
-      <p:cxnSp>
-        <p:nvCxnSpPr>
-          <p:cNvPr id="145" name="Google Shape;145;p21"/>
-          <p:cNvCxnSpPr/>
-          <p:nvPr/>
-        </p:nvCxnSpPr>
-        <p:spPr>
-          <a:xfrm rot="10800000">
-            <a:off x="2334975" y="2814050"/>
-            <a:ext cx="533400" cy="10800"/>
-          </a:xfrm>
-          <a:prstGeom prst="straightConnector1">
-            <a:avLst/>
-          </a:prstGeom>
-          <a:noFill/>
-          <a:ln cap="flat" cmpd="sng" w="9525">
-            <a:solidFill>
-              <a:schemeClr val="dk2"/>
-            </a:solidFill>
-            <a:prstDash val="solid"/>
-            <a:round/>
-            <a:headEnd len="med" w="med" type="none"/>
-            <a:tailEnd len="med" w="med" type="triangle"/>
-          </a:ln>
-        </p:spPr>
-      </p:cxnSp>
-      <p:sp>
-        <p:nvSpPr>
-          <p:cNvPr id="146" name="Google Shape;146;p21"/>
-          <p:cNvSpPr txBox="1"/>
-          <p:nvPr/>
-        </p:nvSpPr>
-        <p:spPr>
-          <a:xfrm>
-            <a:off x="5214225" y="3499600"/>
-            <a:ext cx="2939100" cy="738900"/>
-          </a:xfrm>
-          <a:prstGeom prst="rect">
-            <a:avLst/>
-          </a:prstGeom>
-          <a:noFill/>
-          <a:ln>
-            <a:noFill/>
-          </a:ln>
-        </p:spPr>
-        <p:txBody>
-          <a:bodyPr anchorCtr="0" anchor="t" bIns="91425" lIns="91425" spcFirstLastPara="1" rIns="91425" wrap="square" tIns="91425">
-            <a:spAutoFit/>
-          </a:bodyPr>
-          <a:lstStyle/>
-          <a:p>
-            <a:pPr indent="0" lvl="0" marL="0" rtl="0" algn="l">
-              <a:spcBef>
-                <a:spcPts val="0"/>
-              </a:spcBef>
-              <a:spcAft>
-                <a:spcPts val="0"/>
-              </a:spcAft>
-              <a:buNone/>
-            </a:pPr>
-            <a:r>
-              <a:rPr lang="es" sz="1800">
-                <a:solidFill>
-                  <a:schemeClr val="dk1"/>
-                </a:solidFill>
-                <a:highlight>
-                  <a:srgbClr val="FFFF00"/>
-                </a:highlight>
-                <a:latin typeface="Open Sans"/>
-                <a:ea typeface="Open Sans"/>
-                <a:cs typeface="Open Sans"/>
-                <a:sym typeface="Open Sans"/>
-              </a:rPr>
-              <a:t>recover the image and close the shared memory</a:t>
-            </a:r>
-            <a:endParaRPr sz="1800">
-              <a:solidFill>
-                <a:schemeClr val="dk1"/>
-              </a:solidFill>
-              <a:highlight>
-                <a:srgbClr val="FFFF00"/>
-              </a:highlight>
-              <a:latin typeface="Open Sans"/>
-              <a:ea typeface="Open Sans"/>
-              <a:cs typeface="Open Sans"/>
-              <a:sym typeface="Open Sans"/>
-            </a:endParaRPr>
-          </a:p>
-        </p:txBody>
-      </p:sp>
-      <p:cxnSp>
-        <p:nvCxnSpPr>
-          <p:cNvPr id="147" name="Google Shape;147;p21"/>
-          <p:cNvCxnSpPr>
-            <a:endCxn id="146" idx="1"/>
-          </p:cNvCxnSpPr>
-          <p:nvPr/>
-        </p:nvCxnSpPr>
-        <p:spPr>
-          <a:xfrm flipH="1" rot="10800000">
-            <a:off x="3271125" y="3869050"/>
-            <a:ext cx="1943100" cy="109800"/>
-          </a:xfrm>
-          <a:prstGeom prst="straightConnector1">
-            <a:avLst/>
-          </a:prstGeom>
-          <a:noFill/>
-          <a:ln cap="flat" cmpd="sng" w="9525">
-            <a:solidFill>
-              <a:schemeClr val="dk2"/>
-            </a:solidFill>
-            <a:prstDash val="solid"/>
-            <a:round/>
-            <a:headEnd len="med" w="med" type="none"/>
-            <a:tailEnd len="med" w="med" type="triangle"/>
-          </a:ln>
-        </p:spPr>
-      </p:cxnSp>
-      <p:sp>
-        <p:nvSpPr>
-          <p:cNvPr id="148" name="Google Shape;148;p21"/>
-          <p:cNvSpPr txBox="1"/>
-          <p:nvPr/>
-        </p:nvSpPr>
-        <p:spPr>
-          <a:xfrm>
-            <a:off x="5905475" y="277575"/>
-            <a:ext cx="3048000" cy="738900"/>
-          </a:xfrm>
-          <a:prstGeom prst="rect">
-            <a:avLst/>
-          </a:prstGeom>
-          <a:noFill/>
-          <a:ln>
-            <a:noFill/>
-          </a:ln>
-        </p:spPr>
-        <p:txBody>
-          <a:bodyPr anchorCtr="0" anchor="t" bIns="91425" lIns="91425" spcFirstLastPara="1" rIns="91425" wrap="square" tIns="91425">
-            <a:spAutoFit/>
-          </a:bodyPr>
-          <a:lstStyle/>
-          <a:p>
-            <a:pPr indent="0" lvl="0" marL="0" rtl="0" algn="l">
-              <a:spcBef>
-                <a:spcPts val="0"/>
-              </a:spcBef>
-              <a:spcAft>
-                <a:spcPts val="0"/>
-              </a:spcAft>
-              <a:buNone/>
-            </a:pPr>
-            <a:r>
-              <a:rPr lang="es" sz="1800">
-                <a:solidFill>
-                  <a:schemeClr val="dk1"/>
-                </a:solidFill>
-                <a:highlight>
-                  <a:srgbClr val="FFFF00"/>
-                </a:highlight>
-                <a:latin typeface="Open Sans"/>
-                <a:ea typeface="Open Sans"/>
-                <a:cs typeface="Open Sans"/>
-                <a:sym typeface="Open Sans"/>
-              </a:rPr>
-              <a:t>every worker process a range of rows</a:t>
-            </a:r>
-            <a:endParaRPr sz="1800">
-              <a:solidFill>
-                <a:schemeClr val="dk1"/>
-              </a:solidFill>
-              <a:highlight>
-                <a:srgbClr val="FFFF00"/>
-              </a:highlight>
-              <a:latin typeface="Open Sans"/>
-              <a:ea typeface="Open Sans"/>
-              <a:cs typeface="Open Sans"/>
-              <a:sym typeface="Open Sans"/>
-            </a:endParaRPr>
-          </a:p>
-        </p:txBody>
-      </p:sp>
-      <p:cxnSp>
-        <p:nvCxnSpPr>
-          <p:cNvPr id="149" name="Google Shape;149;p21"/>
-          <p:cNvCxnSpPr/>
-          <p:nvPr/>
-        </p:nvCxnSpPr>
-        <p:spPr>
-          <a:xfrm>
-            <a:off x="4686300" y="429975"/>
-            <a:ext cx="1306200" cy="10800"/>
-          </a:xfrm>
-          <a:prstGeom prst="straightConnector1">
-            <a:avLst/>
-          </a:prstGeom>
-          <a:noFill/>
-          <a:ln cap="flat" cmpd="sng" w="9525">
-            <a:solidFill>
-              <a:schemeClr val="dk2"/>
-            </a:solidFill>
-            <a:prstDash val="solid"/>
-            <a:round/>
-            <a:headEnd len="med" w="med" type="none"/>
-            <a:tailEnd len="med" w="med" type="triangle"/>
-          </a:ln>
-        </p:spPr>
-      </p:cxnSp>
+      </p:pic>
     </p:spTree>
   </p:cSld>
   <p:clrMapOvr>

</xml_diff>